<commit_message>
Updated image and ppt dataset 3
</commit_message>
<xml_diff>
--- a/dataset3.pptx
+++ b/dataset3.pptx
@@ -104,6 +104,11 @@
       </a:defRPr>
     </a:lvl9pPr>
   </p:defaultTextStyle>
+  <p:extLst>
+    <p:ext uri="{EFAFB233-063F-42B5-8137-9DF3F51BA10A}">
+      <p15:sldGuideLst xmlns:p15="http://schemas.microsoft.com/office/powerpoint/2012/main"/>
+    </p:ext>
+  </p:extLst>
 </p:presentation>
 </file>
 
@@ -3577,84 +3582,285 @@
       </p:grpSp>
       <p:sp>
         <p:nvSpPr>
-          <p:cNvPr id="35" name="TextBox 34"/>
-          <p:cNvSpPr txBox="1"/>
+          <p:cNvPr id="22" name="Teardrop 21"/>
+          <p:cNvSpPr>
+            <a:spLocks noChangeAspect="1"/>
+          </p:cNvSpPr>
           <p:nvPr/>
         </p:nvSpPr>
         <p:spPr>
-          <a:xfrm>
-            <a:off x="9348022" y="5328930"/>
-            <a:ext cx="2420643" cy="954107"/>
+          <a:xfrm rot="5400000">
+            <a:off x="162420" y="100330"/>
+            <a:ext cx="594868" cy="619341"/>
           </a:xfrm>
-          <a:prstGeom prst="rect">
+          <a:prstGeom prst="teardrop">
             <a:avLst/>
           </a:prstGeom>
           <a:solidFill>
-            <a:srgbClr val="E7E6E6"/>
+            <a:srgbClr val="238B45"/>
           </a:solidFill>
+          <a:ln>
+            <a:solidFill>
+              <a:schemeClr val="accent1">
+                <a:shade val="50000"/>
+                <a:alpha val="19000"/>
+              </a:schemeClr>
+            </a:solidFill>
+          </a:ln>
         </p:spPr>
-        <p:txBody>
-          <a:bodyPr wrap="square" rtlCol="0">
-            <a:spAutoFit/>
-          </a:bodyPr>
-          <a:lstStyle/>
-          <a:p>
-            <a:r>
-              <a:rPr lang="en-US" sz="2800" dirty="0" smtClean="0">
+        <p:style>
+          <a:lnRef idx="2">
+            <a:schemeClr val="accent1">
+              <a:shade val="50000"/>
+            </a:schemeClr>
+          </a:lnRef>
+          <a:fillRef idx="1">
+            <a:schemeClr val="accent1"/>
+          </a:fillRef>
+          <a:effectRef idx="0">
+            <a:schemeClr val="accent1"/>
+          </a:effectRef>
+          <a:fontRef idx="minor">
+            <a:schemeClr val="lt1"/>
+          </a:fontRef>
+        </p:style>
+        <p:txBody>
+          <a:bodyPr vert="vert270" rtlCol="0" anchor="ctr"/>
+          <a:lstStyle/>
+          <a:p>
+            <a:pPr algn="ctr"/>
+            <a:r>
+              <a:rPr lang="en-US" sz="2800" dirty="0" smtClean="0"/>
+              <a:t>A</a:t>
+            </a:r>
+            <a:endParaRPr lang="en-US" sz="2800" dirty="0"/>
+          </a:p>
+        </p:txBody>
+      </p:sp>
+      <p:grpSp>
+        <p:nvGrpSpPr>
+          <p:cNvPr id="3" name="Group 2"/>
+          <p:cNvGrpSpPr/>
+          <p:nvPr/>
+        </p:nvGrpSpPr>
+        <p:grpSpPr>
+          <a:xfrm>
+            <a:off x="2323983" y="6649832"/>
+            <a:ext cx="4710030" cy="594868"/>
+            <a:chOff x="2249086" y="6644332"/>
+            <a:chExt cx="4710030" cy="594868"/>
+          </a:xfrm>
+        </p:grpSpPr>
+        <p:sp>
+          <p:nvSpPr>
+            <p:cNvPr id="40" name="TextBox 39"/>
+            <p:cNvSpPr txBox="1"/>
+            <p:nvPr/>
+          </p:nvSpPr>
+          <p:spPr>
+            <a:xfrm>
+              <a:off x="2814915" y="6715980"/>
+              <a:ext cx="4144201" cy="523220"/>
+            </a:xfrm>
+            <a:prstGeom prst="rect">
+              <a:avLst/>
+            </a:prstGeom>
+            <a:solidFill>
+              <a:srgbClr val="E7E6E6"/>
+            </a:solidFill>
+          </p:spPr>
+          <p:txBody>
+            <a:bodyPr wrap="square" rtlCol="0">
+              <a:spAutoFit/>
+            </a:bodyPr>
+            <a:lstStyle/>
+            <a:p>
+              <a:r>
+                <a:rPr lang="en-US" sz="2800" dirty="0" smtClean="0">
+                  <a:solidFill>
+                    <a:srgbClr val="238B45"/>
+                  </a:solidFill>
+                </a:rPr>
+                <a:t>Orientation clustering </a:t>
+              </a:r>
+              <a:endParaRPr lang="en-US" sz="2800" dirty="0">
                 <a:solidFill>
                   <a:srgbClr val="238B45"/>
                 </a:solidFill>
-              </a:rPr>
-              <a:t>Hierarchical Clustering </a:t>
-            </a:r>
-            <a:endParaRPr lang="en-US" sz="2800" dirty="0">
+              </a:endParaRPr>
+            </a:p>
+          </p:txBody>
+        </p:sp>
+        <p:sp>
+          <p:nvSpPr>
+            <p:cNvPr id="24" name="Teardrop 23"/>
+            <p:cNvSpPr>
+              <a:spLocks noChangeAspect="1"/>
+            </p:cNvSpPr>
+            <p:nvPr/>
+          </p:nvSpPr>
+          <p:spPr>
+            <a:xfrm rot="5400000">
+              <a:off x="2261323" y="6632095"/>
+              <a:ext cx="594868" cy="619341"/>
+            </a:xfrm>
+            <a:prstGeom prst="teardrop">
+              <a:avLst/>
+            </a:prstGeom>
+            <a:solidFill>
+              <a:srgbClr val="238B45"/>
+            </a:solidFill>
+            <a:ln>
               <a:solidFill>
-                <a:srgbClr val="238B45"/>
+                <a:schemeClr val="accent1">
+                  <a:shade val="50000"/>
+                  <a:alpha val="19000"/>
+                </a:schemeClr>
               </a:solidFill>
-            </a:endParaRPr>
-          </a:p>
-        </p:txBody>
-      </p:sp>
-      <p:sp>
-        <p:nvSpPr>
-          <p:cNvPr id="40" name="TextBox 39"/>
-          <p:cNvSpPr txBox="1"/>
+            </a:ln>
+          </p:spPr>
+          <p:style>
+            <a:lnRef idx="2">
+              <a:schemeClr val="accent1">
+                <a:shade val="50000"/>
+              </a:schemeClr>
+            </a:lnRef>
+            <a:fillRef idx="1">
+              <a:schemeClr val="accent1"/>
+            </a:fillRef>
+            <a:effectRef idx="0">
+              <a:schemeClr val="accent1"/>
+            </a:effectRef>
+            <a:fontRef idx="minor">
+              <a:schemeClr val="lt1"/>
+            </a:fontRef>
+          </p:style>
+          <p:txBody>
+            <a:bodyPr vert="vert270" rtlCol="0" anchor="ctr"/>
+            <a:lstStyle/>
+            <a:p>
+              <a:pPr algn="ctr"/>
+              <a:r>
+                <a:rPr lang="en-US" sz="2800" dirty="0"/>
+                <a:t>B</a:t>
+              </a:r>
+              <a:endParaRPr lang="en-US" sz="2800" dirty="0"/>
+            </a:p>
+          </p:txBody>
+        </p:sp>
+      </p:grpSp>
+      <p:grpSp>
+        <p:nvGrpSpPr>
+          <p:cNvPr id="2" name="Group 1"/>
+          <p:cNvGrpSpPr/>
           <p:nvPr/>
-        </p:nvSpPr>
-        <p:spPr>
+        </p:nvGrpSpPr>
+        <p:grpSpPr>
           <a:xfrm>
-            <a:off x="2230715" y="6729467"/>
-            <a:ext cx="4144201" cy="523220"/>
+            <a:off x="8580266" y="5422557"/>
+            <a:ext cx="3001362" cy="954107"/>
+            <a:chOff x="8767303" y="6361093"/>
+            <a:chExt cx="3001362" cy="954107"/>
           </a:xfrm>
-          <a:prstGeom prst="rect">
-            <a:avLst/>
-          </a:prstGeom>
-          <a:solidFill>
-            <a:srgbClr val="E7E6E6"/>
-          </a:solidFill>
-        </p:spPr>
-        <p:txBody>
-          <a:bodyPr wrap="square" rtlCol="0">
-            <a:spAutoFit/>
-          </a:bodyPr>
-          <a:lstStyle/>
-          <a:p>
-            <a:r>
-              <a:rPr lang="en-US" sz="2800" dirty="0" smtClean="0">
+        </p:grpSpPr>
+        <p:sp>
+          <p:nvSpPr>
+            <p:cNvPr id="35" name="TextBox 34"/>
+            <p:cNvSpPr txBox="1"/>
+            <p:nvPr/>
+          </p:nvSpPr>
+          <p:spPr>
+            <a:xfrm>
+              <a:off x="9348022" y="6361093"/>
+              <a:ext cx="2420643" cy="954107"/>
+            </a:xfrm>
+            <a:prstGeom prst="rect">
+              <a:avLst/>
+            </a:prstGeom>
+            <a:solidFill>
+              <a:srgbClr val="E7E6E6"/>
+            </a:solidFill>
+          </p:spPr>
+          <p:txBody>
+            <a:bodyPr wrap="square" rtlCol="0">
+              <a:spAutoFit/>
+            </a:bodyPr>
+            <a:lstStyle/>
+            <a:p>
+              <a:r>
+                <a:rPr lang="en-US" sz="2800" dirty="0" smtClean="0">
+                  <a:solidFill>
+                    <a:srgbClr val="238B45"/>
+                  </a:solidFill>
+                </a:rPr>
+                <a:t>Hierarchical Clustering </a:t>
+              </a:r>
+              <a:endParaRPr lang="en-US" sz="2800" dirty="0">
                 <a:solidFill>
                   <a:srgbClr val="238B45"/>
                 </a:solidFill>
-              </a:rPr>
-              <a:t>Orientation clustering </a:t>
-            </a:r>
-            <a:endParaRPr lang="en-US" sz="2800" dirty="0">
+              </a:endParaRPr>
+            </a:p>
+          </p:txBody>
+        </p:sp>
+        <p:sp>
+          <p:nvSpPr>
+            <p:cNvPr id="29" name="Teardrop 28"/>
+            <p:cNvSpPr>
+              <a:spLocks noChangeAspect="1"/>
+            </p:cNvSpPr>
+            <p:nvPr/>
+          </p:nvSpPr>
+          <p:spPr>
+            <a:xfrm rot="5400000">
+              <a:off x="8779540" y="6708095"/>
+              <a:ext cx="594868" cy="619341"/>
+            </a:xfrm>
+            <a:prstGeom prst="teardrop">
+              <a:avLst/>
+            </a:prstGeom>
+            <a:solidFill>
+              <a:srgbClr val="238B45"/>
+            </a:solidFill>
+            <a:ln>
               <a:solidFill>
-                <a:srgbClr val="238B45"/>
+                <a:schemeClr val="accent1">
+                  <a:shade val="50000"/>
+                  <a:alpha val="19000"/>
+                </a:schemeClr>
               </a:solidFill>
-            </a:endParaRPr>
-          </a:p>
-        </p:txBody>
-      </p:sp>
+            </a:ln>
+          </p:spPr>
+          <p:style>
+            <a:lnRef idx="2">
+              <a:schemeClr val="accent1">
+                <a:shade val="50000"/>
+              </a:schemeClr>
+            </a:lnRef>
+            <a:fillRef idx="1">
+              <a:schemeClr val="accent1"/>
+            </a:fillRef>
+            <a:effectRef idx="0">
+              <a:schemeClr val="accent1"/>
+            </a:effectRef>
+            <a:fontRef idx="minor">
+              <a:schemeClr val="lt1"/>
+            </a:fontRef>
+          </p:style>
+          <p:txBody>
+            <a:bodyPr vert="vert270" rtlCol="0" anchor="ctr"/>
+            <a:lstStyle/>
+            <a:p>
+              <a:pPr algn="ctr"/>
+              <a:r>
+                <a:rPr lang="en-US" sz="2800" dirty="0"/>
+                <a:t>C</a:t>
+              </a:r>
+              <a:endParaRPr lang="en-US" sz="2800" dirty="0"/>
+            </a:p>
+          </p:txBody>
+        </p:sp>
+      </p:grpSp>
     </p:spTree>
     <p:extLst>
       <p:ext uri="{BB962C8B-B14F-4D97-AF65-F5344CB8AC3E}">

</xml_diff>